<commit_message>
Need to add fit models
Please add fit models in the presentation and conclusion/summary
</commit_message>
<xml_diff>
--- a/Doing_Data_Science/CaseStudy2/Reports/MSDSPresentation.pptx
+++ b/Doing_Data_Science/CaseStudy2/Reports/MSDSPresentation.pptx
@@ -5,7 +5,7 @@
     <p:sldMasterId id="2147483660" r:id="rId1"/>
   </p:sldMasterIdLst>
   <p:notesMasterIdLst>
-    <p:notesMasterId r:id="rId44"/>
+    <p:notesMasterId r:id="rId42"/>
   </p:notesMasterIdLst>
   <p:sldIdLst>
     <p:sldId id="256" r:id="rId2"/>
@@ -35,21 +35,19 @@
     <p:sldId id="307" r:id="rId26"/>
     <p:sldId id="308" r:id="rId27"/>
     <p:sldId id="262" r:id="rId28"/>
-    <p:sldId id="309" r:id="rId29"/>
-    <p:sldId id="290" r:id="rId30"/>
-    <p:sldId id="310" r:id="rId31"/>
-    <p:sldId id="293" r:id="rId32"/>
-    <p:sldId id="300" r:id="rId33"/>
-    <p:sldId id="263" r:id="rId34"/>
-    <p:sldId id="301" r:id="rId35"/>
-    <p:sldId id="264" r:id="rId36"/>
-    <p:sldId id="266" r:id="rId37"/>
-    <p:sldId id="275" r:id="rId38"/>
-    <p:sldId id="295" r:id="rId39"/>
-    <p:sldId id="296" r:id="rId40"/>
-    <p:sldId id="297" r:id="rId41"/>
-    <p:sldId id="286" r:id="rId42"/>
-    <p:sldId id="298" r:id="rId43"/>
+    <p:sldId id="290" r:id="rId29"/>
+    <p:sldId id="310" r:id="rId30"/>
+    <p:sldId id="300" r:id="rId31"/>
+    <p:sldId id="263" r:id="rId32"/>
+    <p:sldId id="301" r:id="rId33"/>
+    <p:sldId id="264" r:id="rId34"/>
+    <p:sldId id="266" r:id="rId35"/>
+    <p:sldId id="275" r:id="rId36"/>
+    <p:sldId id="295" r:id="rId37"/>
+    <p:sldId id="296" r:id="rId38"/>
+    <p:sldId id="297" r:id="rId39"/>
+    <p:sldId id="286" r:id="rId40"/>
+    <p:sldId id="298" r:id="rId41"/>
   </p:sldIdLst>
   <p:sldSz cx="9144000" cy="6858000" type="screen4x3"/>
   <p:notesSz cx="6858000" cy="9144000"/>
@@ -5404,6 +5402,13 @@
       <p:transition advClick="0" advTm="15000"/>
     </mc:Fallback>
   </mc:AlternateContent>
+  <p:timing>
+    <p:tnLst>
+      <p:par>
+        <p:cTn id="1" dur="indefinite" restart="never" nodeType="tmRoot"/>
+      </p:par>
+    </p:tnLst>
+  </p:timing>
 </p:sld>
 </file>
 
@@ -5667,6 +5672,13 @@
       <p:transition advClick="0" advTm="15000"/>
     </mc:Fallback>
   </mc:AlternateContent>
+  <p:timing>
+    <p:tnLst>
+      <p:par>
+        <p:cTn id="1" dur="indefinite" restart="never" nodeType="tmRoot"/>
+      </p:par>
+    </p:tnLst>
+  </p:timing>
 </p:sld>
 </file>
 
@@ -5786,6 +5798,13 @@
       <p:transition advClick="0" advTm="15000"/>
     </mc:Fallback>
   </mc:AlternateContent>
+  <p:timing>
+    <p:tnLst>
+      <p:par>
+        <p:cTn id="1" dur="indefinite" restart="never" nodeType="tmRoot"/>
+      </p:par>
+    </p:tnLst>
+  </p:timing>
 </p:sld>
 </file>
 
@@ -5917,6 +5936,13 @@
       <p:transition advClick="0" advTm="15000"/>
     </mc:Fallback>
   </mc:AlternateContent>
+  <p:timing>
+    <p:tnLst>
+      <p:par>
+        <p:cTn id="1" dur="indefinite" restart="never" nodeType="tmRoot"/>
+      </p:par>
+    </p:tnLst>
+  </p:timing>
 </p:sld>
 </file>
 
@@ -6056,6 +6082,13 @@
       <p:transition advClick="0" advTm="15000"/>
     </mc:Fallback>
   </mc:AlternateContent>
+  <p:timing>
+    <p:tnLst>
+      <p:par>
+        <p:cTn id="1" dur="indefinite" restart="never" nodeType="tmRoot"/>
+      </p:par>
+    </p:tnLst>
+  </p:timing>
 </p:sld>
 </file>
 
@@ -6121,8 +6154,13 @@
             <a:pPr lvl="1"/>
             <a:r>
               <a:rPr lang="en-US" dirty="0"/>
-              <a:t>Tell me the percentages and why</a:t>
-            </a:r>
+              <a:t>Tell me the percentages and </a:t>
+            </a:r>
+            <a:r>
+              <a:rPr lang="en-US" dirty="0" smtClean="0"/>
+              <a:t>why </a:t>
+            </a:r>
+            <a:endParaRPr lang="en-US" dirty="0"/>
           </a:p>
           <a:p>
             <a:pPr lvl="1"/>
@@ -6242,12 +6280,18 @@
         </p:nvSpPr>
         <p:spPr/>
         <p:txBody>
-          <a:bodyPr/>
+          <a:bodyPr>
+            <a:normAutofit fontScale="90000"/>
+          </a:bodyPr>
           <a:lstStyle/>
           <a:p>
             <a:r>
               <a:rPr lang="en-US" dirty="0" smtClean="0"/>
-              <a:t>Evaluation : Percentages and why</a:t>
+              <a:t>Evaluation : Percentages and </a:t>
+            </a:r>
+            <a:r>
+              <a:rPr lang="en-US" dirty="0" smtClean="0"/>
+              <a:t>why – Need to add fit equation For Full Model</a:t>
             </a:r>
             <a:endParaRPr lang="en-US" dirty="0"/>
           </a:p>
@@ -6503,8 +6547,13 @@
           <a:p>
             <a:r>
               <a:rPr lang="en-US" dirty="0"/>
-              <a:t>Forward Selection</a:t>
-            </a:r>
+              <a:t>Forward </a:t>
+            </a:r>
+            <a:r>
+              <a:rPr lang="en-US" dirty="0" smtClean="0"/>
+              <a:t>Selection – Fit equation for Forward Model</a:t>
+            </a:r>
+            <a:endParaRPr lang="en-US" dirty="0"/>
           </a:p>
         </p:txBody>
       </p:sp>
@@ -6842,208 +6891,6 @@
       </p:grpSpPr>
       <p:sp>
         <p:nvSpPr>
-          <p:cNvPr id="2" name="Title 1"/>
-          <p:cNvSpPr>
-            <a:spLocks noGrp="1"/>
-          </p:cNvSpPr>
-          <p:nvPr>
-            <p:ph type="title"/>
-          </p:nvPr>
-        </p:nvSpPr>
-        <p:spPr/>
-        <p:txBody>
-          <a:bodyPr/>
-          <a:lstStyle/>
-          <a:p>
-            <a:r>
-              <a:rPr lang="en-US" dirty="0" smtClean="0"/>
-              <a:t>Forward Selection w/o Job Level</a:t>
-            </a:r>
-            <a:endParaRPr lang="en-US" dirty="0"/>
-          </a:p>
-        </p:txBody>
-      </p:sp>
-      <p:sp>
-        <p:nvSpPr>
-          <p:cNvPr id="4" name="Slide Number Placeholder 3"/>
-          <p:cNvSpPr>
-            <a:spLocks noGrp="1"/>
-          </p:cNvSpPr>
-          <p:nvPr>
-            <p:ph type="sldNum" sz="quarter" idx="12"/>
-          </p:nvPr>
-        </p:nvSpPr>
-        <p:spPr/>
-        <p:txBody>
-          <a:bodyPr/>
-          <a:lstStyle/>
-          <a:p>
-            <a:fld id="{38327683-8978-6B4B-9130-4A6A841F0549}" type="slidenum">
-              <a:rPr lang="en-US" smtClean="0"/>
-              <a:pPr/>
-              <a:t>28</a:t>
-            </a:fld>
-            <a:endParaRPr lang="en-US" dirty="0"/>
-          </a:p>
-        </p:txBody>
-      </p:sp>
-      <p:pic>
-        <p:nvPicPr>
-          <p:cNvPr id="3074" name="Picture 2"/>
-          <p:cNvPicPr>
-            <a:picLocks noGrp="1" noChangeAspect="1" noChangeArrowheads="1"/>
-          </p:cNvPicPr>
-          <p:nvPr>
-            <p:ph idx="1"/>
-          </p:nvPr>
-        </p:nvPicPr>
-        <p:blipFill>
-          <a:blip r:embed="rId2">
-            <a:extLst>
-              <a:ext uri="{28A0092B-C50C-407E-A947-70E740481C1C}">
-                <a14:useLocalDpi xmlns:a14="http://schemas.microsoft.com/office/drawing/2010/main" val="0"/>
-              </a:ext>
-            </a:extLst>
-          </a:blip>
-          <a:srcRect/>
-          <a:stretch>
-            <a:fillRect/>
-          </a:stretch>
-        </p:blipFill>
-        <p:spPr bwMode="auto">
-          <a:xfrm>
-            <a:off x="1295493" y="1825625"/>
-            <a:ext cx="2382665" cy="4351338"/>
-          </a:xfrm>
-          <a:prstGeom prst="rect">
-            <a:avLst/>
-          </a:prstGeom>
-          <a:noFill/>
-          <a:ln>
-            <a:noFill/>
-          </a:ln>
-          <a:extLst>
-            <a:ext uri="{909E8E84-426E-40DD-AFC4-6F175D3DCCD1}">
-              <a14:hiddenFill xmlns:a14="http://schemas.microsoft.com/office/drawing/2010/main">
-                <a:solidFill>
-                  <a:schemeClr val="accent1"/>
-                </a:solidFill>
-              </a14:hiddenFill>
-            </a:ext>
-            <a:ext uri="{91240B29-F687-4F45-9708-019B960494DF}">
-              <a14:hiddenLine xmlns:a14="http://schemas.microsoft.com/office/drawing/2010/main" w="9525">
-                <a:solidFill>
-                  <a:schemeClr val="tx1"/>
-                </a:solidFill>
-                <a:miter lim="800000"/>
-                <a:headEnd/>
-                <a:tailEnd/>
-              </a14:hiddenLine>
-            </a:ext>
-          </a:extLst>
-        </p:spPr>
-      </p:pic>
-      <p:pic>
-        <p:nvPicPr>
-          <p:cNvPr id="3075" name="Picture 3"/>
-          <p:cNvPicPr>
-            <a:picLocks noChangeAspect="1" noChangeArrowheads="1"/>
-          </p:cNvPicPr>
-          <p:nvPr/>
-        </p:nvPicPr>
-        <p:blipFill>
-          <a:blip r:embed="rId3">
-            <a:extLst>
-              <a:ext uri="{28A0092B-C50C-407E-A947-70E740481C1C}">
-                <a14:useLocalDpi xmlns:a14="http://schemas.microsoft.com/office/drawing/2010/main" val="0"/>
-              </a:ext>
-            </a:extLst>
-          </a:blip>
-          <a:srcRect/>
-          <a:stretch>
-            <a:fillRect/>
-          </a:stretch>
-        </p:blipFill>
-        <p:spPr bwMode="auto">
-          <a:xfrm>
-            <a:off x="4332719" y="1825625"/>
-            <a:ext cx="3137776" cy="4411076"/>
-          </a:xfrm>
-          <a:prstGeom prst="rect">
-            <a:avLst/>
-          </a:prstGeom>
-          <a:noFill/>
-          <a:ln>
-            <a:noFill/>
-          </a:ln>
-          <a:extLst>
-            <a:ext uri="{909E8E84-426E-40DD-AFC4-6F175D3DCCD1}">
-              <a14:hiddenFill xmlns:a14="http://schemas.microsoft.com/office/drawing/2010/main">
-                <a:solidFill>
-                  <a:schemeClr val="accent1"/>
-                </a:solidFill>
-              </a14:hiddenFill>
-            </a:ext>
-            <a:ext uri="{91240B29-F687-4F45-9708-019B960494DF}">
-              <a14:hiddenLine xmlns:a14="http://schemas.microsoft.com/office/drawing/2010/main" w="9525">
-                <a:solidFill>
-                  <a:schemeClr val="tx1"/>
-                </a:solidFill>
-                <a:miter lim="800000"/>
-                <a:headEnd/>
-                <a:tailEnd/>
-              </a14:hiddenLine>
-            </a:ext>
-          </a:extLst>
-        </p:spPr>
-      </p:pic>
-    </p:spTree>
-    <p:extLst>
-      <p:ext uri="{BB962C8B-B14F-4D97-AF65-F5344CB8AC3E}">
-        <p14:creationId xmlns:p14="http://schemas.microsoft.com/office/powerpoint/2010/main" val="462370376"/>
-      </p:ext>
-    </p:extLst>
-  </p:cSld>
-  <p:clrMapOvr>
-    <a:masterClrMapping/>
-  </p:clrMapOvr>
-  <mc:AlternateContent xmlns:mc="http://schemas.openxmlformats.org/markup-compatibility/2006" xmlns:p14="http://schemas.microsoft.com/office/powerpoint/2010/main">
-    <mc:Choice Requires="p14">
-      <p:transition p14:dur="0" advClick="0" advTm="15000"/>
-    </mc:Choice>
-    <mc:Fallback xmlns="">
-      <p:transition advClick="0" advTm="15000"/>
-    </mc:Fallback>
-  </mc:AlternateContent>
-  <p:timing>
-    <p:tnLst>
-      <p:par>
-        <p:cTn id="1" dur="indefinite" restart="never" nodeType="tmRoot"/>
-      </p:par>
-    </p:tnLst>
-  </p:timing>
-</p:sld>
-</file>
-
-<file path=ppt/slides/slide29.xml><?xml version="1.0" encoding="utf-8"?>
-<p:sld xmlns:a="http://schemas.openxmlformats.org/drawingml/2006/main" xmlns:r="http://schemas.openxmlformats.org/officeDocument/2006/relationships" xmlns:p="http://schemas.openxmlformats.org/presentationml/2006/main">
-  <p:cSld>
-    <p:spTree>
-      <p:nvGrpSpPr>
-        <p:cNvPr id="1" name=""/>
-        <p:cNvGrpSpPr/>
-        <p:nvPr/>
-      </p:nvGrpSpPr>
-      <p:grpSpPr>
-        <a:xfrm>
-          <a:off x="0" y="0"/>
-          <a:ext cx="0" cy="0"/>
-          <a:chOff x="0" y="0"/>
-          <a:chExt cx="0" cy="0"/>
-        </a:xfrm>
-      </p:grpSpPr>
-      <p:sp>
-        <p:nvSpPr>
           <p:cNvPr id="2" name="Title 1">
             <a:extLst>
               <a:ext uri="{FF2B5EF4-FFF2-40B4-BE49-F238E27FC236}">
@@ -7109,7 +6956,7 @@
             <a:fld id="{38327683-8978-6B4B-9130-4A6A841F0549}" type="slidenum">
               <a:rPr lang="en-US" smtClean="0"/>
               <a:pPr/>
-              <a:t>29</a:t>
+              <a:t>28</a:t>
             </a:fld>
             <a:endParaRPr lang="en-US" dirty="0"/>
           </a:p>
@@ -7197,7 +7044,7 @@
 </p:sld>
 </file>
 
-<file path=ppt/slides/slide3.xml><?xml version="1.0" encoding="utf-8"?>
+<file path=ppt/slides/slide29.xml><?xml version="1.0" encoding="utf-8"?>
 <p:sld xmlns:a="http://schemas.openxmlformats.org/drawingml/2006/main" xmlns:r="http://schemas.openxmlformats.org/officeDocument/2006/relationships" xmlns:p="http://schemas.openxmlformats.org/presentationml/2006/main">
   <p:cSld>
     <p:spTree>
@@ -7231,123 +7078,6 @@
           <a:p>
             <a:r>
               <a:rPr lang="en-US" dirty="0" smtClean="0"/>
-              <a:t>Business Objectives</a:t>
-            </a:r>
-            <a:endParaRPr lang="en-US" dirty="0"/>
-          </a:p>
-        </p:txBody>
-      </p:sp>
-      <p:sp>
-        <p:nvSpPr>
-          <p:cNvPr id="3" name="Content Placeholder 2"/>
-          <p:cNvSpPr>
-            <a:spLocks noGrp="1"/>
-          </p:cNvSpPr>
-          <p:nvPr>
-            <p:ph idx="1"/>
-          </p:nvPr>
-        </p:nvSpPr>
-        <p:spPr/>
-        <p:txBody>
-          <a:bodyPr/>
-          <a:lstStyle/>
-          <a:p>
-            <a:r>
-              <a:rPr lang="en-US" dirty="0"/>
-              <a:t>The purpose of this analysis is to try to </a:t>
-            </a:r>
-            <a:r>
-              <a:rPr lang="en-US" dirty="0" err="1"/>
-              <a:t>dilucidate</a:t>
-            </a:r>
-            <a:r>
-              <a:rPr lang="en-US" dirty="0"/>
-              <a:t> what are the most important factors that contribute to attrition, amongst the many factors affect an employee’s environment and satisfaction. Once these factors are determined, a company can take actions to control them.</a:t>
-            </a:r>
-          </a:p>
-          <a:p>
-            <a:endParaRPr lang="en-US" dirty="0"/>
-          </a:p>
-        </p:txBody>
-      </p:sp>
-      <p:sp>
-        <p:nvSpPr>
-          <p:cNvPr id="4" name="Slide Number Placeholder 3"/>
-          <p:cNvSpPr>
-            <a:spLocks noGrp="1"/>
-          </p:cNvSpPr>
-          <p:nvPr>
-            <p:ph type="sldNum" sz="quarter" idx="12"/>
-          </p:nvPr>
-        </p:nvSpPr>
-        <p:spPr/>
-        <p:txBody>
-          <a:bodyPr/>
-          <a:lstStyle/>
-          <a:p>
-            <a:fld id="{38327683-8978-6B4B-9130-4A6A841F0549}" type="slidenum">
-              <a:rPr lang="en-US" smtClean="0"/>
-              <a:t>3</a:t>
-            </a:fld>
-            <a:endParaRPr lang="en-US" dirty="0"/>
-          </a:p>
-        </p:txBody>
-      </p:sp>
-    </p:spTree>
-    <p:extLst>
-      <p:ext uri="{BB962C8B-B14F-4D97-AF65-F5344CB8AC3E}">
-        <p14:creationId xmlns:p14="http://schemas.microsoft.com/office/powerpoint/2010/main" val="1881417302"/>
-      </p:ext>
-    </p:extLst>
-  </p:cSld>
-  <p:clrMapOvr>
-    <a:masterClrMapping/>
-  </p:clrMapOvr>
-  <mc:AlternateContent xmlns:mc="http://schemas.openxmlformats.org/markup-compatibility/2006" xmlns:p14="http://schemas.microsoft.com/office/powerpoint/2010/main">
-    <mc:Choice Requires="p14">
-      <p:transition p14:dur="0" advClick="0" advTm="15000"/>
-    </mc:Choice>
-    <mc:Fallback xmlns="">
-      <p:transition advClick="0" advTm="15000"/>
-    </mc:Fallback>
-  </mc:AlternateContent>
-</p:sld>
-</file>
-
-<file path=ppt/slides/slide30.xml><?xml version="1.0" encoding="utf-8"?>
-<p:sld xmlns:a="http://schemas.openxmlformats.org/drawingml/2006/main" xmlns:r="http://schemas.openxmlformats.org/officeDocument/2006/relationships" xmlns:p="http://schemas.openxmlformats.org/presentationml/2006/main">
-  <p:cSld>
-    <p:spTree>
-      <p:nvGrpSpPr>
-        <p:cNvPr id="1" name=""/>
-        <p:cNvGrpSpPr/>
-        <p:nvPr/>
-      </p:nvGrpSpPr>
-      <p:grpSpPr>
-        <a:xfrm>
-          <a:off x="0" y="0"/>
-          <a:ext cx="0" cy="0"/>
-          <a:chOff x="0" y="0"/>
-          <a:chExt cx="0" cy="0"/>
-        </a:xfrm>
-      </p:grpSpPr>
-      <p:sp>
-        <p:nvSpPr>
-          <p:cNvPr id="2" name="Title 1"/>
-          <p:cNvSpPr>
-            <a:spLocks noGrp="1"/>
-          </p:cNvSpPr>
-          <p:nvPr>
-            <p:ph type="title"/>
-          </p:nvPr>
-        </p:nvSpPr>
-        <p:spPr/>
-        <p:txBody>
-          <a:bodyPr/>
-          <a:lstStyle/>
-          <a:p>
-            <a:r>
-              <a:rPr lang="en-US" dirty="0" smtClean="0"/>
               <a:t>VIF for Forward model w/o Job Level and ROC Curve</a:t>
             </a:r>
             <a:endParaRPr lang="en-US" dirty="0"/>
@@ -7372,7 +7102,7 @@
             <a:fld id="{38327683-8978-6B4B-9130-4A6A841F0549}" type="slidenum">
               <a:rPr lang="en-US" smtClean="0"/>
               <a:pPr/>
-              <a:t>30</a:t>
+              <a:t>29</a:t>
             </a:fld>
             <a:endParaRPr lang="en-US" dirty="0"/>
           </a:p>
@@ -7506,10 +7236,17 @@
       <p:transition advClick="0" advTm="15000"/>
     </mc:Fallback>
   </mc:AlternateContent>
+  <p:timing>
+    <p:tnLst>
+      <p:par>
+        <p:cTn id="1" dur="indefinite" restart="never" nodeType="tmRoot"/>
+      </p:par>
+    </p:tnLst>
+  </p:timing>
 </p:sld>
 </file>
 
-<file path=ppt/slides/slide31.xml><?xml version="1.0" encoding="utf-8"?>
+<file path=ppt/slides/slide3.xml><?xml version="1.0" encoding="utf-8"?>
 <p:sld xmlns:a="http://schemas.openxmlformats.org/drawingml/2006/main" xmlns:r="http://schemas.openxmlformats.org/officeDocument/2006/relationships" xmlns:p="http://schemas.openxmlformats.org/presentationml/2006/main">
   <p:cSld>
     <p:spTree>
@@ -7528,13 +7265,7 @@
       </p:grpSpPr>
       <p:sp>
         <p:nvSpPr>
-          <p:cNvPr id="2" name="Title 1">
-            <a:extLst>
-              <a:ext uri="{FF2B5EF4-FFF2-40B4-BE49-F238E27FC236}">
-                <a16:creationId xmlns:a16="http://schemas.microsoft.com/office/drawing/2014/main" xmlns="" id="{C5D36AD1-E9E4-4A0A-BEED-BB08C79C099A}"/>
-              </a:ext>
-            </a:extLst>
-          </p:cNvPr>
+          <p:cNvPr id="2" name="Title 1"/>
           <p:cNvSpPr>
             <a:spLocks noGrp="1"/>
           </p:cNvSpPr>
@@ -7548,21 +7279,49 @@
           <a:lstStyle/>
           <a:p>
             <a:r>
+              <a:rPr lang="en-US" dirty="0" smtClean="0"/>
+              <a:t>Business Objectives</a:t>
+            </a:r>
+            <a:endParaRPr lang="en-US" dirty="0"/>
+          </a:p>
+        </p:txBody>
+      </p:sp>
+      <p:sp>
+        <p:nvSpPr>
+          <p:cNvPr id="3" name="Content Placeholder 2"/>
+          <p:cNvSpPr>
+            <a:spLocks noGrp="1"/>
+          </p:cNvSpPr>
+          <p:nvPr>
+            <p:ph idx="1"/>
+          </p:nvPr>
+        </p:nvSpPr>
+        <p:spPr/>
+        <p:txBody>
+          <a:bodyPr/>
+          <a:lstStyle/>
+          <a:p>
+            <a:r>
               <a:rPr lang="en-US" dirty="0"/>
-              <a:t>Stepwise selection</a:t>
-            </a:r>
-          </a:p>
-        </p:txBody>
-      </p:sp>
-      <p:sp>
-        <p:nvSpPr>
-          <p:cNvPr id="4" name="Slide Number Placeholder 3">
-            <a:extLst>
-              <a:ext uri="{FF2B5EF4-FFF2-40B4-BE49-F238E27FC236}">
-                <a16:creationId xmlns:a16="http://schemas.microsoft.com/office/drawing/2014/main" xmlns="" id="{F1DF75B2-4C0D-48AA-B72F-65242DD5ACEB}"/>
-              </a:ext>
-            </a:extLst>
-          </p:cNvPr>
+              <a:t>The purpose of this analysis is to try to </a:t>
+            </a:r>
+            <a:r>
+              <a:rPr lang="en-US" dirty="0" err="1"/>
+              <a:t>dilucidate</a:t>
+            </a:r>
+            <a:r>
+              <a:rPr lang="en-US" dirty="0"/>
+              <a:t> what are the most important factors that contribute to attrition, amongst the many factors affect an employee’s environment and satisfaction. Once these factors are determined, a company can take actions to control them.</a:t>
+            </a:r>
+          </a:p>
+          <a:p>
+            <a:endParaRPr lang="en-US" dirty="0"/>
+          </a:p>
+        </p:txBody>
+      </p:sp>
+      <p:sp>
+        <p:nvSpPr>
+          <p:cNvPr id="4" name="Slide Number Placeholder 3"/>
           <p:cNvSpPr>
             <a:spLocks noGrp="1"/>
           </p:cNvSpPr>
@@ -7577,281 +7336,16 @@
           <a:p>
             <a:fld id="{38327683-8978-6B4B-9130-4A6A841F0549}" type="slidenum">
               <a:rPr lang="en-US" smtClean="0"/>
-              <a:pPr/>
-              <a:t>31</a:t>
+              <a:t>3</a:t>
             </a:fld>
             <a:endParaRPr lang="en-US" dirty="0"/>
           </a:p>
         </p:txBody>
       </p:sp>
-      <p:sp>
-        <p:nvSpPr>
-          <p:cNvPr id="8" name="Arrow: Right 7">
-            <a:extLst>
-              <a:ext uri="{FF2B5EF4-FFF2-40B4-BE49-F238E27FC236}">
-                <a16:creationId xmlns:a16="http://schemas.microsoft.com/office/drawing/2014/main" xmlns="" id="{9769F50E-E2F8-4285-AE95-E9284F1EB50D}"/>
-              </a:ext>
-            </a:extLst>
-          </p:cNvPr>
-          <p:cNvSpPr/>
-          <p:nvPr/>
-        </p:nvSpPr>
-        <p:spPr>
-          <a:xfrm rot="10800000">
-            <a:off x="4275952" y="3032208"/>
-            <a:ext cx="459360" cy="187641"/>
-          </a:xfrm>
-          <a:prstGeom prst="rightArrow">
-            <a:avLst>
-              <a:gd name="adj1" fmla="val 50000"/>
-              <a:gd name="adj2" fmla="val 55062"/>
-            </a:avLst>
-          </a:prstGeom>
-        </p:spPr>
-        <p:style>
-          <a:lnRef idx="2">
-            <a:schemeClr val="accent1">
-              <a:shade val="50000"/>
-            </a:schemeClr>
-          </a:lnRef>
-          <a:fillRef idx="1">
-            <a:schemeClr val="accent1"/>
-          </a:fillRef>
-          <a:effectRef idx="0">
-            <a:schemeClr val="accent1"/>
-          </a:effectRef>
-          <a:fontRef idx="minor">
-            <a:schemeClr val="lt1"/>
-          </a:fontRef>
-        </p:style>
-        <p:txBody>
-          <a:bodyPr rtlCol="0" anchor="ctr"/>
-          <a:lstStyle/>
-          <a:p>
-            <a:pPr algn="ctr"/>
-            <a:endParaRPr lang="en-US"/>
-          </a:p>
-        </p:txBody>
-      </p:sp>
-      <p:sp>
-        <p:nvSpPr>
-          <p:cNvPr id="9" name="Arrow: Right 8">
-            <a:extLst>
-              <a:ext uri="{FF2B5EF4-FFF2-40B4-BE49-F238E27FC236}">
-                <a16:creationId xmlns:a16="http://schemas.microsoft.com/office/drawing/2014/main" xmlns="" id="{CB970237-4D33-465D-A024-2CF3C85AEBF7}"/>
-              </a:ext>
-            </a:extLst>
-          </p:cNvPr>
-          <p:cNvSpPr/>
-          <p:nvPr/>
-        </p:nvSpPr>
-        <p:spPr>
-          <a:xfrm rot="10800000">
-            <a:off x="4275952" y="3308592"/>
-            <a:ext cx="459360" cy="187641"/>
-          </a:xfrm>
-          <a:prstGeom prst="rightArrow">
-            <a:avLst>
-              <a:gd name="adj1" fmla="val 50000"/>
-              <a:gd name="adj2" fmla="val 55062"/>
-            </a:avLst>
-          </a:prstGeom>
-        </p:spPr>
-        <p:style>
-          <a:lnRef idx="2">
-            <a:schemeClr val="accent1">
-              <a:shade val="50000"/>
-            </a:schemeClr>
-          </a:lnRef>
-          <a:fillRef idx="1">
-            <a:schemeClr val="accent1"/>
-          </a:fillRef>
-          <a:effectRef idx="0">
-            <a:schemeClr val="accent1"/>
-          </a:effectRef>
-          <a:fontRef idx="minor">
-            <a:schemeClr val="lt1"/>
-          </a:fontRef>
-        </p:style>
-        <p:txBody>
-          <a:bodyPr rtlCol="0" anchor="ctr"/>
-          <a:lstStyle/>
-          <a:p>
-            <a:pPr algn="ctr"/>
-            <a:endParaRPr lang="en-US"/>
-          </a:p>
-        </p:txBody>
-      </p:sp>
-      <p:sp>
-        <p:nvSpPr>
-          <p:cNvPr id="10" name="Rectangle 9">
-            <a:extLst>
-              <a:ext uri="{FF2B5EF4-FFF2-40B4-BE49-F238E27FC236}">
-                <a16:creationId xmlns:a16="http://schemas.microsoft.com/office/drawing/2014/main" xmlns="" id="{94652B0C-33C2-4A34-BEA4-D81DF5671040}"/>
-              </a:ext>
-            </a:extLst>
-          </p:cNvPr>
-          <p:cNvSpPr/>
-          <p:nvPr/>
-        </p:nvSpPr>
-        <p:spPr>
-          <a:xfrm>
-            <a:off x="5133741" y="2940748"/>
-            <a:ext cx="2515681" cy="923330"/>
-          </a:xfrm>
-          <a:prstGeom prst="rect">
-            <a:avLst/>
-          </a:prstGeom>
-        </p:spPr>
-        <p:txBody>
-          <a:bodyPr wrap="square">
-            <a:spAutoFit/>
-          </a:bodyPr>
-          <a:lstStyle/>
-          <a:p>
-            <a:r>
-              <a:rPr lang="en-US" dirty="0"/>
-              <a:t>Removing </a:t>
-            </a:r>
-            <a:r>
-              <a:rPr lang="en-US" dirty="0" err="1"/>
-              <a:t>JobLevel</a:t>
-            </a:r>
-            <a:r>
-              <a:rPr lang="en-US" dirty="0"/>
-              <a:t> since </a:t>
-            </a:r>
-            <a:r>
-              <a:rPr lang="en-US" dirty="0" err="1"/>
-              <a:t>JobRole</a:t>
-            </a:r>
-            <a:r>
-              <a:rPr lang="en-US" dirty="0"/>
-              <a:t> and </a:t>
-            </a:r>
-            <a:r>
-              <a:rPr lang="en-US" dirty="0" err="1"/>
-              <a:t>JobLevel</a:t>
-            </a:r>
-            <a:r>
-              <a:rPr lang="en-US" dirty="0"/>
-              <a:t> are highly correlated</a:t>
-            </a:r>
-          </a:p>
-        </p:txBody>
-      </p:sp>
-      <p:pic>
-        <p:nvPicPr>
-          <p:cNvPr id="5122" name="Picture 2"/>
-          <p:cNvPicPr>
-            <a:picLocks noChangeAspect="1" noChangeArrowheads="1"/>
-          </p:cNvPicPr>
-          <p:nvPr/>
-        </p:nvPicPr>
-        <p:blipFill>
-          <a:blip r:embed="rId2">
-            <a:extLst>
-              <a:ext uri="{28A0092B-C50C-407E-A947-70E740481C1C}">
-                <a14:useLocalDpi xmlns:a14="http://schemas.microsoft.com/office/drawing/2010/main" val="0"/>
-              </a:ext>
-            </a:extLst>
-          </a:blip>
-          <a:srcRect/>
-          <a:stretch>
-            <a:fillRect/>
-          </a:stretch>
-        </p:blipFill>
-        <p:spPr bwMode="auto">
-          <a:xfrm>
-            <a:off x="1433513" y="1403024"/>
-            <a:ext cx="6276975" cy="1009650"/>
-          </a:xfrm>
-          <a:prstGeom prst="rect">
-            <a:avLst/>
-          </a:prstGeom>
-          <a:noFill/>
-          <a:ln>
-            <a:noFill/>
-          </a:ln>
-          <a:extLst>
-            <a:ext uri="{909E8E84-426E-40DD-AFC4-6F175D3DCCD1}">
-              <a14:hiddenFill xmlns:a14="http://schemas.microsoft.com/office/drawing/2010/main">
-                <a:solidFill>
-                  <a:schemeClr val="accent1"/>
-                </a:solidFill>
-              </a14:hiddenFill>
-            </a:ext>
-            <a:ext uri="{91240B29-F687-4F45-9708-019B960494DF}">
-              <a14:hiddenLine xmlns:a14="http://schemas.microsoft.com/office/drawing/2010/main" w="9525">
-                <a:solidFill>
-                  <a:schemeClr val="tx1"/>
-                </a:solidFill>
-                <a:miter lim="800000"/>
-                <a:headEnd/>
-                <a:tailEnd/>
-              </a14:hiddenLine>
-            </a:ext>
-          </a:extLst>
-        </p:spPr>
-      </p:pic>
-      <p:pic>
-        <p:nvPicPr>
-          <p:cNvPr id="5123" name="Picture 3"/>
-          <p:cNvPicPr>
-            <a:picLocks noChangeAspect="1" noChangeArrowheads="1"/>
-          </p:cNvPicPr>
-          <p:nvPr/>
-        </p:nvPicPr>
-        <p:blipFill>
-          <a:blip r:embed="rId3">
-            <a:extLst>
-              <a:ext uri="{28A0092B-C50C-407E-A947-70E740481C1C}">
-                <a14:useLocalDpi xmlns:a14="http://schemas.microsoft.com/office/drawing/2010/main" val="0"/>
-              </a:ext>
-            </a:extLst>
-          </a:blip>
-          <a:srcRect/>
-          <a:stretch>
-            <a:fillRect/>
-          </a:stretch>
-        </p:blipFill>
-        <p:spPr bwMode="auto">
-          <a:xfrm>
-            <a:off x="825694" y="2565401"/>
-            <a:ext cx="3305175" cy="3790950"/>
-          </a:xfrm>
-          <a:prstGeom prst="rect">
-            <a:avLst/>
-          </a:prstGeom>
-          <a:noFill/>
-          <a:ln>
-            <a:noFill/>
-          </a:ln>
-          <a:extLst>
-            <a:ext uri="{909E8E84-426E-40DD-AFC4-6F175D3DCCD1}">
-              <a14:hiddenFill xmlns:a14="http://schemas.microsoft.com/office/drawing/2010/main">
-                <a:solidFill>
-                  <a:schemeClr val="accent1"/>
-                </a:solidFill>
-              </a14:hiddenFill>
-            </a:ext>
-            <a:ext uri="{91240B29-F687-4F45-9708-019B960494DF}">
-              <a14:hiddenLine xmlns:a14="http://schemas.microsoft.com/office/drawing/2010/main" w="9525">
-                <a:solidFill>
-                  <a:schemeClr val="tx1"/>
-                </a:solidFill>
-                <a:miter lim="800000"/>
-                <a:headEnd/>
-                <a:tailEnd/>
-              </a14:hiddenLine>
-            </a:ext>
-          </a:extLst>
-        </p:spPr>
-      </p:pic>
     </p:spTree>
     <p:extLst>
       <p:ext uri="{BB962C8B-B14F-4D97-AF65-F5344CB8AC3E}">
-        <p14:creationId xmlns:p14="http://schemas.microsoft.com/office/powerpoint/2010/main" val="2760957041"/>
+        <p14:creationId xmlns:p14="http://schemas.microsoft.com/office/powerpoint/2010/main" val="1881417302"/>
       </p:ext>
     </p:extLst>
   </p:cSld>
@@ -7869,7 +7363,7 @@
 </p:sld>
 </file>
 
-<file path=ppt/slides/slide32.xml><?xml version="1.0" encoding="utf-8"?>
+<file path=ppt/slides/slide30.xml><?xml version="1.0" encoding="utf-8"?>
 <p:sld xmlns:a="http://schemas.openxmlformats.org/drawingml/2006/main" xmlns:r="http://schemas.openxmlformats.org/officeDocument/2006/relationships" xmlns:p="http://schemas.openxmlformats.org/presentationml/2006/main">
   <p:cSld>
     <p:spTree>
@@ -7934,10 +7428,22 @@
           <a:p>
             <a:r>
               <a:rPr lang="en-US" dirty="0" smtClean="0"/>
-              <a:t>Forward – 764.3014</a:t>
-            </a:r>
-          </a:p>
-          <a:p>
+              <a:t>Deviance</a:t>
+            </a:r>
+          </a:p>
+          <a:p>
+            <a:pPr lvl="1"/>
+            <a:r>
+              <a:rPr lang="en-US" dirty="0" smtClean="0"/>
+              <a:t>Forward </a:t>
+            </a:r>
+            <a:r>
+              <a:rPr lang="en-US" dirty="0" smtClean="0"/>
+              <a:t>– 764.3014</a:t>
+            </a:r>
+          </a:p>
+          <a:p>
+            <a:pPr lvl="1"/>
             <a:r>
               <a:rPr lang="en-US" dirty="0" smtClean="0"/>
               <a:t>Stepwise – 764.3014</a:t>
@@ -7987,7 +7493,7 @@
             <a:fld id="{38327683-8978-6B4B-9130-4A6A841F0549}" type="slidenum">
               <a:rPr lang="en-US" smtClean="0"/>
               <a:pPr/>
-              <a:t>32</a:t>
+              <a:t>30</a:t>
             </a:fld>
             <a:endParaRPr lang="en-US" dirty="0"/>
           </a:p>
@@ -8014,7 +7520,7 @@
 </p:sld>
 </file>
 
-<file path=ppt/slides/slide33.xml><?xml version="1.0" encoding="utf-8"?>
+<file path=ppt/slides/slide31.xml><?xml version="1.0" encoding="utf-8"?>
 <p:sld xmlns:a="http://schemas.openxmlformats.org/drawingml/2006/main" xmlns:r="http://schemas.openxmlformats.org/officeDocument/2006/relationships" xmlns:p="http://schemas.openxmlformats.org/presentationml/2006/main">
   <p:cSld>
     <p:spTree>
@@ -8113,7 +7619,7 @@
           <a:p>
             <a:fld id="{38327683-8978-6B4B-9130-4A6A841F0549}" type="slidenum">
               <a:rPr lang="en-US" smtClean="0"/>
-              <a:t>33</a:t>
+              <a:t>31</a:t>
             </a:fld>
             <a:endParaRPr lang="en-US" dirty="0"/>
           </a:p>
@@ -8194,7 +7700,7 @@
 </p:sld>
 </file>
 
-<file path=ppt/slides/slide34.xml><?xml version="1.0" encoding="utf-8"?>
+<file path=ppt/slides/slide32.xml><?xml version="1.0" encoding="utf-8"?>
 <p:sld xmlns:a="http://schemas.openxmlformats.org/drawingml/2006/main" xmlns:r="http://schemas.openxmlformats.org/officeDocument/2006/relationships" xmlns:p="http://schemas.openxmlformats.org/presentationml/2006/main">
   <p:cSld>
     <p:spTree>
@@ -8279,7 +7785,7 @@
             <a:fld id="{38327683-8978-6B4B-9130-4A6A841F0549}" type="slidenum">
               <a:rPr lang="en-US" smtClean="0"/>
               <a:pPr/>
-              <a:t>34</a:t>
+              <a:t>32</a:t>
             </a:fld>
             <a:endParaRPr lang="en-US" dirty="0"/>
           </a:p>
@@ -8360,7 +7866,7 @@
 </p:sld>
 </file>
 
-<file path=ppt/slides/slide35.xml><?xml version="1.0" encoding="utf-8"?>
+<file path=ppt/slides/slide33.xml><?xml version="1.0" encoding="utf-8"?>
 <p:sld xmlns:a="http://schemas.openxmlformats.org/drawingml/2006/main" xmlns:r="http://schemas.openxmlformats.org/officeDocument/2006/relationships" xmlns:p="http://schemas.openxmlformats.org/presentationml/2006/main">
   <p:cSld>
     <p:spTree>
@@ -8448,7 +7954,7 @@
           <a:p>
             <a:fld id="{38327683-8978-6B4B-9130-4A6A841F0549}" type="slidenum">
               <a:rPr lang="en-US" smtClean="0"/>
-              <a:t>35</a:t>
+              <a:t>33</a:t>
             </a:fld>
             <a:endParaRPr lang="en-US" dirty="0"/>
           </a:p>
@@ -8529,7 +8035,7 @@
 </p:sld>
 </file>
 
-<file path=ppt/slides/slide36.xml><?xml version="1.0" encoding="utf-8"?>
+<file path=ppt/slides/slide34.xml><?xml version="1.0" encoding="utf-8"?>
 <p:sld xmlns:a="http://schemas.openxmlformats.org/drawingml/2006/main" xmlns:r="http://schemas.openxmlformats.org/officeDocument/2006/relationships" xmlns:p="http://schemas.openxmlformats.org/presentationml/2006/main">
   <p:cSld>
     <p:spTree>
@@ -8589,7 +8095,7 @@
           <a:p>
             <a:fld id="{38327683-8978-6B4B-9130-4A6A841F0549}" type="slidenum">
               <a:rPr lang="en-US" smtClean="0"/>
-              <a:t>36</a:t>
+              <a:t>34</a:t>
             </a:fld>
             <a:endParaRPr lang="en-US" dirty="0"/>
           </a:p>
@@ -8670,7 +8176,7 @@
 </p:sld>
 </file>
 
-<file path=ppt/slides/slide37.xml><?xml version="1.0" encoding="utf-8"?>
+<file path=ppt/slides/slide35.xml><?xml version="1.0" encoding="utf-8"?>
 <p:sld xmlns:a="http://schemas.openxmlformats.org/drawingml/2006/main" xmlns:r="http://schemas.openxmlformats.org/officeDocument/2006/relationships" xmlns:p="http://schemas.openxmlformats.org/presentationml/2006/main">
   <p:cSld>
     <p:spTree>
@@ -8726,7 +8232,7 @@
           <a:p>
             <a:fld id="{38327683-8978-6B4B-9130-4A6A841F0549}" type="slidenum">
               <a:rPr lang="en-US" smtClean="0"/>
-              <a:t>37</a:t>
+              <a:t>35</a:t>
             </a:fld>
             <a:endParaRPr lang="en-US" dirty="0"/>
           </a:p>
@@ -8807,7 +8313,7 @@
 </p:sld>
 </file>
 
-<file path=ppt/slides/slide38.xml><?xml version="1.0" encoding="utf-8"?>
+<file path=ppt/slides/slide36.xml><?xml version="1.0" encoding="utf-8"?>
 <p:sld xmlns:a="http://schemas.openxmlformats.org/drawingml/2006/main" xmlns:r="http://schemas.openxmlformats.org/officeDocument/2006/relationships" xmlns:p="http://schemas.openxmlformats.org/presentationml/2006/main">
   <p:cSld>
     <p:spTree>
@@ -8909,7 +8415,7 @@
             <a:fld id="{38327683-8978-6B4B-9130-4A6A841F0549}" type="slidenum">
               <a:rPr lang="en-US" smtClean="0"/>
               <a:pPr/>
-              <a:t>38</a:t>
+              <a:t>36</a:t>
             </a:fld>
             <a:endParaRPr lang="en-US" dirty="0"/>
           </a:p>
@@ -8936,7 +8442,7 @@
 </p:sld>
 </file>
 
-<file path=ppt/slides/slide39.xml><?xml version="1.0" encoding="utf-8"?>
+<file path=ppt/slides/slide37.xml><?xml version="1.0" encoding="utf-8"?>
 <p:sld xmlns:a="http://schemas.openxmlformats.org/drawingml/2006/main" xmlns:r="http://schemas.openxmlformats.org/officeDocument/2006/relationships" xmlns:p="http://schemas.openxmlformats.org/presentationml/2006/main">
   <p:cSld>
     <p:spTree>
@@ -9014,7 +8520,7 @@
             <a:fld id="{38327683-8978-6B4B-9130-4A6A841F0549}" type="slidenum">
               <a:rPr lang="en-US" smtClean="0"/>
               <a:pPr/>
-              <a:t>39</a:t>
+              <a:t>37</a:t>
             </a:fld>
             <a:endParaRPr lang="en-US" dirty="0"/>
           </a:p>
@@ -9095,7 +8601,7 @@
 </p:sld>
 </file>
 
-<file path=ppt/slides/slide4.xml><?xml version="1.0" encoding="utf-8"?>
+<file path=ppt/slides/slide38.xml><?xml version="1.0" encoding="utf-8"?>
 <p:sld xmlns:a="http://schemas.openxmlformats.org/drawingml/2006/main" xmlns:r="http://schemas.openxmlformats.org/officeDocument/2006/relationships" xmlns:p="http://schemas.openxmlformats.org/presentationml/2006/main">
   <p:cSld>
     <p:spTree>
@@ -9114,664 +8620,6 @@
       </p:grpSpPr>
       <p:sp>
         <p:nvSpPr>
-          <p:cNvPr id="2" name="Title 1"/>
-          <p:cNvSpPr>
-            <a:spLocks noGrp="1"/>
-          </p:cNvSpPr>
-          <p:nvPr>
-            <p:ph type="title"/>
-          </p:nvPr>
-        </p:nvSpPr>
-        <p:spPr/>
-        <p:txBody>
-          <a:bodyPr/>
-          <a:lstStyle/>
-          <a:p>
-            <a:r>
-              <a:rPr lang="en-US" dirty="0"/>
-              <a:t>How to keep employee</a:t>
-            </a:r>
-          </a:p>
-        </p:txBody>
-      </p:sp>
-      <p:sp>
-        <p:nvSpPr>
-          <p:cNvPr id="4" name="Slide Number Placeholder 3"/>
-          <p:cNvSpPr>
-            <a:spLocks noGrp="1"/>
-          </p:cNvSpPr>
-          <p:nvPr>
-            <p:ph type="sldNum" sz="quarter" idx="12"/>
-          </p:nvPr>
-        </p:nvSpPr>
-        <p:spPr/>
-        <p:txBody>
-          <a:bodyPr/>
-          <a:lstStyle/>
-          <a:p>
-            <a:fld id="{38327683-8978-6B4B-9130-4A6A841F0549}" type="slidenum">
-              <a:rPr lang="en-US" smtClean="0"/>
-              <a:pPr/>
-              <a:t>4</a:t>
-            </a:fld>
-            <a:endParaRPr lang="en-US" dirty="0"/>
-          </a:p>
-        </p:txBody>
-      </p:sp>
-      <p:cxnSp>
-        <p:nvCxnSpPr>
-          <p:cNvPr id="6" name="Straight Arrow Connector 5"/>
-          <p:cNvCxnSpPr/>
-          <p:nvPr/>
-        </p:nvCxnSpPr>
-        <p:spPr>
-          <a:xfrm flipV="1">
-            <a:off x="1643743" y="2057402"/>
-            <a:ext cx="32657" cy="3331028"/>
-          </a:xfrm>
-          <a:prstGeom prst="straightConnector1">
-            <a:avLst/>
-          </a:prstGeom>
-          <a:ln w="28575">
-            <a:tailEnd type="stealth" w="lg" len="lg"/>
-          </a:ln>
-        </p:spPr>
-        <p:style>
-          <a:lnRef idx="1">
-            <a:schemeClr val="accent1"/>
-          </a:lnRef>
-          <a:fillRef idx="0">
-            <a:schemeClr val="accent1"/>
-          </a:fillRef>
-          <a:effectRef idx="0">
-            <a:schemeClr val="accent1"/>
-          </a:effectRef>
-          <a:fontRef idx="minor">
-            <a:schemeClr val="tx1"/>
-          </a:fontRef>
-        </p:style>
-      </p:cxnSp>
-      <p:cxnSp>
-        <p:nvCxnSpPr>
-          <p:cNvPr id="8" name="Straight Arrow Connector 7"/>
-          <p:cNvCxnSpPr/>
-          <p:nvPr/>
-        </p:nvCxnSpPr>
-        <p:spPr>
-          <a:xfrm flipV="1">
-            <a:off x="1643743" y="5388430"/>
-            <a:ext cx="6183086" cy="1"/>
-          </a:xfrm>
-          <a:prstGeom prst="straightConnector1">
-            <a:avLst/>
-          </a:prstGeom>
-          <a:ln w="25400">
-            <a:tailEnd type="stealth" w="lg" len="lg"/>
-          </a:ln>
-        </p:spPr>
-        <p:style>
-          <a:lnRef idx="1">
-            <a:schemeClr val="accent1"/>
-          </a:lnRef>
-          <a:fillRef idx="0">
-            <a:schemeClr val="accent1"/>
-          </a:fillRef>
-          <a:effectRef idx="0">
-            <a:schemeClr val="accent1"/>
-          </a:effectRef>
-          <a:fontRef idx="minor">
-            <a:schemeClr val="tx1"/>
-          </a:fontRef>
-        </p:style>
-      </p:cxnSp>
-      <p:sp>
-        <p:nvSpPr>
-          <p:cNvPr id="10" name="Rectangle 9"/>
-          <p:cNvSpPr/>
-          <p:nvPr/>
-        </p:nvSpPr>
-        <p:spPr>
-          <a:xfrm>
-            <a:off x="2304789" y="1942715"/>
-            <a:ext cx="1603332" cy="1528175"/>
-          </a:xfrm>
-          <a:prstGeom prst="rect">
-            <a:avLst/>
-          </a:prstGeom>
-          <a:solidFill>
-            <a:srgbClr val="FFFF00"/>
-          </a:solidFill>
-        </p:spPr>
-        <p:style>
-          <a:lnRef idx="2">
-            <a:schemeClr val="accent1">
-              <a:shade val="50000"/>
-            </a:schemeClr>
-          </a:lnRef>
-          <a:fillRef idx="1">
-            <a:schemeClr val="accent1"/>
-          </a:fillRef>
-          <a:effectRef idx="0">
-            <a:schemeClr val="accent1"/>
-          </a:effectRef>
-          <a:fontRef idx="minor">
-            <a:schemeClr val="lt1"/>
-          </a:fontRef>
-        </p:style>
-        <p:txBody>
-          <a:bodyPr rtlCol="0" anchor="ctr"/>
-          <a:lstStyle/>
-          <a:p>
-            <a:pPr algn="ctr"/>
-            <a:endParaRPr lang="en-US"/>
-          </a:p>
-        </p:txBody>
-      </p:sp>
-      <p:sp>
-        <p:nvSpPr>
-          <p:cNvPr id="11" name="Rectangle 10"/>
-          <p:cNvSpPr/>
-          <p:nvPr/>
-        </p:nvSpPr>
-        <p:spPr>
-          <a:xfrm>
-            <a:off x="2304789" y="3722916"/>
-            <a:ext cx="1603332" cy="1528175"/>
-          </a:xfrm>
-          <a:prstGeom prst="rect">
-            <a:avLst/>
-          </a:prstGeom>
-          <a:solidFill>
-            <a:srgbClr val="FFFF00"/>
-          </a:solidFill>
-        </p:spPr>
-        <p:style>
-          <a:lnRef idx="2">
-            <a:schemeClr val="accent1">
-              <a:shade val="50000"/>
-            </a:schemeClr>
-          </a:lnRef>
-          <a:fillRef idx="1">
-            <a:schemeClr val="accent1"/>
-          </a:fillRef>
-          <a:effectRef idx="0">
-            <a:schemeClr val="accent1"/>
-          </a:effectRef>
-          <a:fontRef idx="minor">
-            <a:schemeClr val="lt1"/>
-          </a:fontRef>
-        </p:style>
-        <p:txBody>
-          <a:bodyPr rtlCol="0" anchor="ctr"/>
-          <a:lstStyle/>
-          <a:p>
-            <a:pPr algn="ctr"/>
-            <a:endParaRPr lang="en-US"/>
-          </a:p>
-        </p:txBody>
-      </p:sp>
-      <p:sp>
-        <p:nvSpPr>
-          <p:cNvPr id="12" name="Rectangle 11"/>
-          <p:cNvSpPr/>
-          <p:nvPr/>
-        </p:nvSpPr>
-        <p:spPr>
-          <a:xfrm>
-            <a:off x="4264070" y="1942714"/>
-            <a:ext cx="1603332" cy="1528175"/>
-          </a:xfrm>
-          <a:prstGeom prst="rect">
-            <a:avLst/>
-          </a:prstGeom>
-          <a:solidFill>
-            <a:srgbClr val="FF0000"/>
-          </a:solidFill>
-        </p:spPr>
-        <p:style>
-          <a:lnRef idx="2">
-            <a:schemeClr val="accent1">
-              <a:shade val="50000"/>
-            </a:schemeClr>
-          </a:lnRef>
-          <a:fillRef idx="1">
-            <a:schemeClr val="accent1"/>
-          </a:fillRef>
-          <a:effectRef idx="0">
-            <a:schemeClr val="accent1"/>
-          </a:effectRef>
-          <a:fontRef idx="minor">
-            <a:schemeClr val="lt1"/>
-          </a:fontRef>
-        </p:style>
-        <p:txBody>
-          <a:bodyPr rtlCol="0" anchor="ctr"/>
-          <a:lstStyle/>
-          <a:p>
-            <a:pPr algn="ctr"/>
-            <a:endParaRPr lang="en-US"/>
-          </a:p>
-        </p:txBody>
-      </p:sp>
-      <p:sp>
-        <p:nvSpPr>
-          <p:cNvPr id="13" name="Rectangle 12"/>
-          <p:cNvSpPr/>
-          <p:nvPr/>
-        </p:nvSpPr>
-        <p:spPr>
-          <a:xfrm>
-            <a:off x="4264070" y="3722914"/>
-            <a:ext cx="1603332" cy="1528175"/>
-          </a:xfrm>
-          <a:prstGeom prst="rect">
-            <a:avLst/>
-          </a:prstGeom>
-          <a:solidFill>
-            <a:srgbClr val="92D050"/>
-          </a:solidFill>
-        </p:spPr>
-        <p:style>
-          <a:lnRef idx="2">
-            <a:schemeClr val="accent1">
-              <a:shade val="50000"/>
-            </a:schemeClr>
-          </a:lnRef>
-          <a:fillRef idx="1">
-            <a:schemeClr val="accent1"/>
-          </a:fillRef>
-          <a:effectRef idx="0">
-            <a:schemeClr val="accent1"/>
-          </a:effectRef>
-          <a:fontRef idx="minor">
-            <a:schemeClr val="lt1"/>
-          </a:fontRef>
-        </p:style>
-        <p:txBody>
-          <a:bodyPr rtlCol="0" anchor="ctr"/>
-          <a:lstStyle/>
-          <a:p>
-            <a:pPr algn="ctr"/>
-            <a:endParaRPr lang="en-US"/>
-          </a:p>
-        </p:txBody>
-      </p:sp>
-      <p:sp>
-        <p:nvSpPr>
-          <p:cNvPr id="14" name="TextBox 13"/>
-          <p:cNvSpPr txBox="1"/>
-          <p:nvPr/>
-        </p:nvSpPr>
-        <p:spPr>
-          <a:xfrm>
-            <a:off x="2818356" y="5686816"/>
-            <a:ext cx="2843408" cy="369332"/>
-          </a:xfrm>
-          <a:prstGeom prst="rect">
-            <a:avLst/>
-          </a:prstGeom>
-          <a:noFill/>
-        </p:spPr>
-        <p:txBody>
-          <a:bodyPr wrap="square" rtlCol="0">
-            <a:spAutoFit/>
-          </a:bodyPr>
-          <a:lstStyle/>
-          <a:p>
-            <a:r>
-              <a:rPr lang="en-US" dirty="0"/>
-              <a:t>Employee lifetime value</a:t>
-            </a:r>
-          </a:p>
-        </p:txBody>
-      </p:sp>
-      <p:sp>
-        <p:nvSpPr>
-          <p:cNvPr id="15" name="TextBox 14"/>
-          <p:cNvSpPr txBox="1"/>
-          <p:nvPr/>
-        </p:nvSpPr>
-        <p:spPr>
-          <a:xfrm rot="16200000">
-            <a:off x="571037" y="3287532"/>
-            <a:ext cx="1778696" cy="366713"/>
-          </a:xfrm>
-          <a:prstGeom prst="rect">
-            <a:avLst/>
-          </a:prstGeom>
-          <a:noFill/>
-        </p:spPr>
-        <p:txBody>
-          <a:bodyPr wrap="square" rtlCol="0">
-            <a:spAutoFit/>
-          </a:bodyPr>
-          <a:lstStyle/>
-          <a:p>
-            <a:r>
-              <a:rPr lang="en-US"/>
-              <a:t>Attrition Risk</a:t>
-            </a:r>
-          </a:p>
-        </p:txBody>
-      </p:sp>
-      <p:sp>
-        <p:nvSpPr>
-          <p:cNvPr id="16" name="TextBox 15"/>
-          <p:cNvSpPr txBox="1"/>
-          <p:nvPr/>
-        </p:nvSpPr>
-        <p:spPr>
-          <a:xfrm>
-            <a:off x="4471792" y="3990905"/>
-            <a:ext cx="1189972" cy="369332"/>
-          </a:xfrm>
-          <a:prstGeom prst="rect">
-            <a:avLst/>
-          </a:prstGeom>
-          <a:noFill/>
-        </p:spPr>
-        <p:txBody>
-          <a:bodyPr wrap="square" rtlCol="0">
-            <a:spAutoFit/>
-          </a:bodyPr>
-          <a:lstStyle/>
-          <a:p>
-            <a:r>
-              <a:rPr lang="en-US" dirty="0"/>
-              <a:t>Maintain</a:t>
-            </a:r>
-          </a:p>
-        </p:txBody>
-      </p:sp>
-      <p:sp>
-        <p:nvSpPr>
-          <p:cNvPr id="17" name="TextBox 16"/>
-          <p:cNvSpPr txBox="1"/>
-          <p:nvPr/>
-        </p:nvSpPr>
-        <p:spPr>
-          <a:xfrm>
-            <a:off x="2567836" y="3990905"/>
-            <a:ext cx="1114816" cy="369332"/>
-          </a:xfrm>
-          <a:prstGeom prst="rect">
-            <a:avLst/>
-          </a:prstGeom>
-          <a:noFill/>
-        </p:spPr>
-        <p:txBody>
-          <a:bodyPr wrap="square" rtlCol="0">
-            <a:spAutoFit/>
-          </a:bodyPr>
-          <a:lstStyle/>
-          <a:p>
-            <a:r>
-              <a:rPr lang="en-US" dirty="0"/>
-              <a:t>Grow-up</a:t>
-            </a:r>
-          </a:p>
-        </p:txBody>
-      </p:sp>
-      <p:sp>
-        <p:nvSpPr>
-          <p:cNvPr id="18" name="TextBox 17"/>
-          <p:cNvSpPr txBox="1"/>
-          <p:nvPr/>
-        </p:nvSpPr>
-        <p:spPr>
-          <a:xfrm>
-            <a:off x="2567836" y="2204613"/>
-            <a:ext cx="1114816" cy="376960"/>
-          </a:xfrm>
-          <a:prstGeom prst="rect">
-            <a:avLst/>
-          </a:prstGeom>
-          <a:noFill/>
-        </p:spPr>
-        <p:txBody>
-          <a:bodyPr wrap="square" rtlCol="0">
-            <a:spAutoFit/>
-          </a:bodyPr>
-          <a:lstStyle/>
-          <a:p>
-            <a:pPr algn="ctr"/>
-            <a:r>
-              <a:rPr lang="en-US" dirty="0"/>
-              <a:t>Divest?</a:t>
-            </a:r>
-          </a:p>
-        </p:txBody>
-      </p:sp>
-      <p:sp>
-        <p:nvSpPr>
-          <p:cNvPr id="19" name="TextBox 18"/>
-          <p:cNvSpPr txBox="1"/>
-          <p:nvPr/>
-        </p:nvSpPr>
-        <p:spPr>
-          <a:xfrm>
-            <a:off x="4264070" y="2195155"/>
-            <a:ext cx="1603332" cy="646331"/>
-          </a:xfrm>
-          <a:prstGeom prst="rect">
-            <a:avLst/>
-          </a:prstGeom>
-          <a:noFill/>
-        </p:spPr>
-        <p:txBody>
-          <a:bodyPr wrap="square" rtlCol="0">
-            <a:spAutoFit/>
-          </a:bodyPr>
-          <a:lstStyle/>
-          <a:p>
-            <a:pPr algn="ctr"/>
-            <a:r>
-              <a:rPr lang="en-US" dirty="0">
-                <a:solidFill>
-                  <a:schemeClr val="bg1"/>
-                </a:solidFill>
-              </a:rPr>
-              <a:t>Aggressively retain</a:t>
-            </a:r>
-          </a:p>
-        </p:txBody>
-      </p:sp>
-      <p:sp>
-        <p:nvSpPr>
-          <p:cNvPr id="20" name="TextBox 19"/>
-          <p:cNvSpPr txBox="1"/>
-          <p:nvPr/>
-        </p:nvSpPr>
-        <p:spPr>
-          <a:xfrm>
-            <a:off x="4366889" y="2855192"/>
-            <a:ext cx="1397694" cy="461665"/>
-          </a:xfrm>
-          <a:prstGeom prst="rect">
-            <a:avLst/>
-          </a:prstGeom>
-          <a:noFill/>
-        </p:spPr>
-        <p:txBody>
-          <a:bodyPr wrap="square" rtlCol="0">
-            <a:spAutoFit/>
-          </a:bodyPr>
-          <a:lstStyle/>
-          <a:p>
-            <a:pPr algn="ctr"/>
-            <a:r>
-              <a:rPr lang="en-US" sz="1200" dirty="0">
-                <a:solidFill>
-                  <a:schemeClr val="bg1"/>
-                </a:solidFill>
-              </a:rPr>
-              <a:t>High value.</a:t>
-            </a:r>
-          </a:p>
-          <a:p>
-            <a:pPr algn="ctr"/>
-            <a:r>
-              <a:rPr lang="en-US" sz="1200" dirty="0">
-                <a:solidFill>
-                  <a:schemeClr val="bg1"/>
-                </a:solidFill>
-              </a:rPr>
-              <a:t>High Attrition Risk</a:t>
-            </a:r>
-          </a:p>
-        </p:txBody>
-      </p:sp>
-      <p:sp>
-        <p:nvSpPr>
-          <p:cNvPr id="21" name="TextBox 20"/>
-          <p:cNvSpPr txBox="1"/>
-          <p:nvPr/>
-        </p:nvSpPr>
-        <p:spPr>
-          <a:xfrm>
-            <a:off x="4264070" y="4412668"/>
-            <a:ext cx="1397694" cy="461665"/>
-          </a:xfrm>
-          <a:prstGeom prst="rect">
-            <a:avLst/>
-          </a:prstGeom>
-          <a:noFill/>
-        </p:spPr>
-        <p:txBody>
-          <a:bodyPr wrap="square" rtlCol="0">
-            <a:spAutoFit/>
-          </a:bodyPr>
-          <a:lstStyle/>
-          <a:p>
-            <a:pPr algn="ctr"/>
-            <a:r>
-              <a:rPr lang="en-US" sz="1200" dirty="0"/>
-              <a:t>High value.</a:t>
-            </a:r>
-          </a:p>
-          <a:p>
-            <a:pPr algn="ctr"/>
-            <a:r>
-              <a:rPr lang="en-US" sz="1200" dirty="0"/>
-              <a:t>Low Attrition Risk</a:t>
-            </a:r>
-          </a:p>
-        </p:txBody>
-      </p:sp>
-      <p:sp>
-        <p:nvSpPr>
-          <p:cNvPr id="22" name="TextBox 21"/>
-          <p:cNvSpPr txBox="1"/>
-          <p:nvPr/>
-        </p:nvSpPr>
-        <p:spPr>
-          <a:xfrm>
-            <a:off x="2407608" y="4450155"/>
-            <a:ext cx="1397694" cy="461665"/>
-          </a:xfrm>
-          <a:prstGeom prst="rect">
-            <a:avLst/>
-          </a:prstGeom>
-          <a:noFill/>
-        </p:spPr>
-        <p:txBody>
-          <a:bodyPr wrap="square" rtlCol="0">
-            <a:spAutoFit/>
-          </a:bodyPr>
-          <a:lstStyle/>
-          <a:p>
-            <a:pPr algn="ctr"/>
-            <a:r>
-              <a:rPr lang="en-US" sz="1200" dirty="0"/>
-              <a:t>Low value.</a:t>
-            </a:r>
-          </a:p>
-          <a:p>
-            <a:pPr algn="ctr"/>
-            <a:r>
-              <a:rPr lang="en-US" sz="1200" dirty="0"/>
-              <a:t>Low Attrition Risk</a:t>
-            </a:r>
-          </a:p>
-        </p:txBody>
-      </p:sp>
-      <p:sp>
-        <p:nvSpPr>
-          <p:cNvPr id="23" name="TextBox 22"/>
-          <p:cNvSpPr txBox="1"/>
-          <p:nvPr/>
-        </p:nvSpPr>
-        <p:spPr>
-          <a:xfrm>
-            <a:off x="2426397" y="2874798"/>
-            <a:ext cx="1397694" cy="461665"/>
-          </a:xfrm>
-          <a:prstGeom prst="rect">
-            <a:avLst/>
-          </a:prstGeom>
-          <a:noFill/>
-        </p:spPr>
-        <p:txBody>
-          <a:bodyPr wrap="square" rtlCol="0">
-            <a:spAutoFit/>
-          </a:bodyPr>
-          <a:lstStyle/>
-          <a:p>
-            <a:pPr algn="ctr"/>
-            <a:r>
-              <a:rPr lang="en-US" sz="1200" dirty="0"/>
-              <a:t>Low value.</a:t>
-            </a:r>
-          </a:p>
-          <a:p>
-            <a:pPr algn="ctr"/>
-            <a:r>
-              <a:rPr lang="en-US" sz="1200" dirty="0"/>
-              <a:t>High Attrition Risk</a:t>
-            </a:r>
-          </a:p>
-        </p:txBody>
-      </p:sp>
-    </p:spTree>
-    <p:extLst>
-      <p:ext uri="{BB962C8B-B14F-4D97-AF65-F5344CB8AC3E}">
-        <p14:creationId xmlns:p14="http://schemas.microsoft.com/office/powerpoint/2010/main" val="1204180998"/>
-      </p:ext>
-    </p:extLst>
-  </p:cSld>
-  <p:clrMapOvr>
-    <a:masterClrMapping/>
-  </p:clrMapOvr>
-  <mc:AlternateContent xmlns:mc="http://schemas.openxmlformats.org/markup-compatibility/2006" xmlns:p14="http://schemas.microsoft.com/office/powerpoint/2010/main">
-    <mc:Choice Requires="p14">
-      <p:transition p14:dur="0" advClick="0" advTm="15000"/>
-    </mc:Choice>
-    <mc:Fallback xmlns="">
-      <p:transition advClick="0" advTm="15000"/>
-    </mc:Fallback>
-  </mc:AlternateContent>
-</p:sld>
-</file>
-
-<file path=ppt/slides/slide40.xml><?xml version="1.0" encoding="utf-8"?>
-<p:sld xmlns:a="http://schemas.openxmlformats.org/drawingml/2006/main" xmlns:r="http://schemas.openxmlformats.org/officeDocument/2006/relationships" xmlns:p="http://schemas.openxmlformats.org/presentationml/2006/main">
-  <p:cSld>
-    <p:spTree>
-      <p:nvGrpSpPr>
-        <p:cNvPr id="1" name=""/>
-        <p:cNvGrpSpPr/>
-        <p:nvPr/>
-      </p:nvGrpSpPr>
-      <p:grpSpPr>
-        <a:xfrm>
-          <a:off x="0" y="0"/>
-          <a:ext cx="0" cy="0"/>
-          <a:chOff x="0" y="0"/>
-          <a:chExt cx="0" cy="0"/>
-        </a:xfrm>
-      </p:grpSpPr>
-      <p:sp>
-        <p:nvSpPr>
           <p:cNvPr id="2" name="Title 1">
             <a:extLst>
               <a:ext uri="{FF2B5EF4-FFF2-40B4-BE49-F238E27FC236}">
@@ -9822,7 +8670,7 @@
             <a:fld id="{38327683-8978-6B4B-9130-4A6A841F0549}" type="slidenum">
               <a:rPr lang="en-US" smtClean="0"/>
               <a:pPr/>
-              <a:t>40</a:t>
+              <a:t>38</a:t>
             </a:fld>
             <a:endParaRPr lang="en-US" dirty="0"/>
           </a:p>
@@ -9903,7 +8751,7 @@
 </p:sld>
 </file>
 
-<file path=ppt/slides/slide41.xml><?xml version="1.0" encoding="utf-8"?>
+<file path=ppt/slides/slide39.xml><?xml version="1.0" encoding="utf-8"?>
 <p:sld xmlns:a="http://schemas.openxmlformats.org/drawingml/2006/main" xmlns:r="http://schemas.openxmlformats.org/officeDocument/2006/relationships" xmlns:p="http://schemas.openxmlformats.org/presentationml/2006/main">
   <p:cSld>
     <p:spTree>
@@ -9968,7 +8816,7 @@
           <a:p>
             <a:fld id="{38327683-8978-6B4B-9130-4A6A841F0549}" type="slidenum">
               <a:rPr lang="en-US" smtClean="0"/>
-              <a:t>41</a:t>
+              <a:t>39</a:t>
             </a:fld>
             <a:endParaRPr lang="en-US" dirty="0"/>
           </a:p>
@@ -10025,7 +8873,7 @@
 </p:sld>
 </file>
 
-<file path=ppt/slides/slide42.xml><?xml version="1.0" encoding="utf-8"?>
+<file path=ppt/slides/slide4.xml><?xml version="1.0" encoding="utf-8"?>
 <p:sld xmlns:a="http://schemas.openxmlformats.org/drawingml/2006/main" xmlns:r="http://schemas.openxmlformats.org/officeDocument/2006/relationships" xmlns:p="http://schemas.openxmlformats.org/presentationml/2006/main">
   <p:cSld>
     <p:spTree>
@@ -10044,6 +8892,664 @@
       </p:grpSpPr>
       <p:sp>
         <p:nvSpPr>
+          <p:cNvPr id="2" name="Title 1"/>
+          <p:cNvSpPr>
+            <a:spLocks noGrp="1"/>
+          </p:cNvSpPr>
+          <p:nvPr>
+            <p:ph type="title"/>
+          </p:nvPr>
+        </p:nvSpPr>
+        <p:spPr/>
+        <p:txBody>
+          <a:bodyPr/>
+          <a:lstStyle/>
+          <a:p>
+            <a:r>
+              <a:rPr lang="en-US" dirty="0"/>
+              <a:t>How to keep employee</a:t>
+            </a:r>
+          </a:p>
+        </p:txBody>
+      </p:sp>
+      <p:sp>
+        <p:nvSpPr>
+          <p:cNvPr id="4" name="Slide Number Placeholder 3"/>
+          <p:cNvSpPr>
+            <a:spLocks noGrp="1"/>
+          </p:cNvSpPr>
+          <p:nvPr>
+            <p:ph type="sldNum" sz="quarter" idx="12"/>
+          </p:nvPr>
+        </p:nvSpPr>
+        <p:spPr/>
+        <p:txBody>
+          <a:bodyPr/>
+          <a:lstStyle/>
+          <a:p>
+            <a:fld id="{38327683-8978-6B4B-9130-4A6A841F0549}" type="slidenum">
+              <a:rPr lang="en-US" smtClean="0"/>
+              <a:pPr/>
+              <a:t>4</a:t>
+            </a:fld>
+            <a:endParaRPr lang="en-US" dirty="0"/>
+          </a:p>
+        </p:txBody>
+      </p:sp>
+      <p:cxnSp>
+        <p:nvCxnSpPr>
+          <p:cNvPr id="6" name="Straight Arrow Connector 5"/>
+          <p:cNvCxnSpPr/>
+          <p:nvPr/>
+        </p:nvCxnSpPr>
+        <p:spPr>
+          <a:xfrm flipV="1">
+            <a:off x="1643743" y="2057402"/>
+            <a:ext cx="32657" cy="3331028"/>
+          </a:xfrm>
+          <a:prstGeom prst="straightConnector1">
+            <a:avLst/>
+          </a:prstGeom>
+          <a:ln w="28575">
+            <a:tailEnd type="stealth" w="lg" len="lg"/>
+          </a:ln>
+        </p:spPr>
+        <p:style>
+          <a:lnRef idx="1">
+            <a:schemeClr val="accent1"/>
+          </a:lnRef>
+          <a:fillRef idx="0">
+            <a:schemeClr val="accent1"/>
+          </a:fillRef>
+          <a:effectRef idx="0">
+            <a:schemeClr val="accent1"/>
+          </a:effectRef>
+          <a:fontRef idx="minor">
+            <a:schemeClr val="tx1"/>
+          </a:fontRef>
+        </p:style>
+      </p:cxnSp>
+      <p:cxnSp>
+        <p:nvCxnSpPr>
+          <p:cNvPr id="8" name="Straight Arrow Connector 7"/>
+          <p:cNvCxnSpPr/>
+          <p:nvPr/>
+        </p:nvCxnSpPr>
+        <p:spPr>
+          <a:xfrm flipV="1">
+            <a:off x="1643743" y="5388430"/>
+            <a:ext cx="6183086" cy="1"/>
+          </a:xfrm>
+          <a:prstGeom prst="straightConnector1">
+            <a:avLst/>
+          </a:prstGeom>
+          <a:ln w="25400">
+            <a:tailEnd type="stealth" w="lg" len="lg"/>
+          </a:ln>
+        </p:spPr>
+        <p:style>
+          <a:lnRef idx="1">
+            <a:schemeClr val="accent1"/>
+          </a:lnRef>
+          <a:fillRef idx="0">
+            <a:schemeClr val="accent1"/>
+          </a:fillRef>
+          <a:effectRef idx="0">
+            <a:schemeClr val="accent1"/>
+          </a:effectRef>
+          <a:fontRef idx="minor">
+            <a:schemeClr val="tx1"/>
+          </a:fontRef>
+        </p:style>
+      </p:cxnSp>
+      <p:sp>
+        <p:nvSpPr>
+          <p:cNvPr id="10" name="Rectangle 9"/>
+          <p:cNvSpPr/>
+          <p:nvPr/>
+        </p:nvSpPr>
+        <p:spPr>
+          <a:xfrm>
+            <a:off x="2304789" y="1942715"/>
+            <a:ext cx="1603332" cy="1528175"/>
+          </a:xfrm>
+          <a:prstGeom prst="rect">
+            <a:avLst/>
+          </a:prstGeom>
+          <a:solidFill>
+            <a:srgbClr val="FFFF00"/>
+          </a:solidFill>
+        </p:spPr>
+        <p:style>
+          <a:lnRef idx="2">
+            <a:schemeClr val="accent1">
+              <a:shade val="50000"/>
+            </a:schemeClr>
+          </a:lnRef>
+          <a:fillRef idx="1">
+            <a:schemeClr val="accent1"/>
+          </a:fillRef>
+          <a:effectRef idx="0">
+            <a:schemeClr val="accent1"/>
+          </a:effectRef>
+          <a:fontRef idx="minor">
+            <a:schemeClr val="lt1"/>
+          </a:fontRef>
+        </p:style>
+        <p:txBody>
+          <a:bodyPr rtlCol="0" anchor="ctr"/>
+          <a:lstStyle/>
+          <a:p>
+            <a:pPr algn="ctr"/>
+            <a:endParaRPr lang="en-US"/>
+          </a:p>
+        </p:txBody>
+      </p:sp>
+      <p:sp>
+        <p:nvSpPr>
+          <p:cNvPr id="11" name="Rectangle 10"/>
+          <p:cNvSpPr/>
+          <p:nvPr/>
+        </p:nvSpPr>
+        <p:spPr>
+          <a:xfrm>
+            <a:off x="2304789" y="3722916"/>
+            <a:ext cx="1603332" cy="1528175"/>
+          </a:xfrm>
+          <a:prstGeom prst="rect">
+            <a:avLst/>
+          </a:prstGeom>
+          <a:solidFill>
+            <a:srgbClr val="FFFF00"/>
+          </a:solidFill>
+        </p:spPr>
+        <p:style>
+          <a:lnRef idx="2">
+            <a:schemeClr val="accent1">
+              <a:shade val="50000"/>
+            </a:schemeClr>
+          </a:lnRef>
+          <a:fillRef idx="1">
+            <a:schemeClr val="accent1"/>
+          </a:fillRef>
+          <a:effectRef idx="0">
+            <a:schemeClr val="accent1"/>
+          </a:effectRef>
+          <a:fontRef idx="minor">
+            <a:schemeClr val="lt1"/>
+          </a:fontRef>
+        </p:style>
+        <p:txBody>
+          <a:bodyPr rtlCol="0" anchor="ctr"/>
+          <a:lstStyle/>
+          <a:p>
+            <a:pPr algn="ctr"/>
+            <a:endParaRPr lang="en-US"/>
+          </a:p>
+        </p:txBody>
+      </p:sp>
+      <p:sp>
+        <p:nvSpPr>
+          <p:cNvPr id="12" name="Rectangle 11"/>
+          <p:cNvSpPr/>
+          <p:nvPr/>
+        </p:nvSpPr>
+        <p:spPr>
+          <a:xfrm>
+            <a:off x="4264070" y="1942714"/>
+            <a:ext cx="1603332" cy="1528175"/>
+          </a:xfrm>
+          <a:prstGeom prst="rect">
+            <a:avLst/>
+          </a:prstGeom>
+          <a:solidFill>
+            <a:srgbClr val="FF0000"/>
+          </a:solidFill>
+        </p:spPr>
+        <p:style>
+          <a:lnRef idx="2">
+            <a:schemeClr val="accent1">
+              <a:shade val="50000"/>
+            </a:schemeClr>
+          </a:lnRef>
+          <a:fillRef idx="1">
+            <a:schemeClr val="accent1"/>
+          </a:fillRef>
+          <a:effectRef idx="0">
+            <a:schemeClr val="accent1"/>
+          </a:effectRef>
+          <a:fontRef idx="minor">
+            <a:schemeClr val="lt1"/>
+          </a:fontRef>
+        </p:style>
+        <p:txBody>
+          <a:bodyPr rtlCol="0" anchor="ctr"/>
+          <a:lstStyle/>
+          <a:p>
+            <a:pPr algn="ctr"/>
+            <a:endParaRPr lang="en-US"/>
+          </a:p>
+        </p:txBody>
+      </p:sp>
+      <p:sp>
+        <p:nvSpPr>
+          <p:cNvPr id="13" name="Rectangle 12"/>
+          <p:cNvSpPr/>
+          <p:nvPr/>
+        </p:nvSpPr>
+        <p:spPr>
+          <a:xfrm>
+            <a:off x="4264070" y="3722914"/>
+            <a:ext cx="1603332" cy="1528175"/>
+          </a:xfrm>
+          <a:prstGeom prst="rect">
+            <a:avLst/>
+          </a:prstGeom>
+          <a:solidFill>
+            <a:srgbClr val="92D050"/>
+          </a:solidFill>
+        </p:spPr>
+        <p:style>
+          <a:lnRef idx="2">
+            <a:schemeClr val="accent1">
+              <a:shade val="50000"/>
+            </a:schemeClr>
+          </a:lnRef>
+          <a:fillRef idx="1">
+            <a:schemeClr val="accent1"/>
+          </a:fillRef>
+          <a:effectRef idx="0">
+            <a:schemeClr val="accent1"/>
+          </a:effectRef>
+          <a:fontRef idx="minor">
+            <a:schemeClr val="lt1"/>
+          </a:fontRef>
+        </p:style>
+        <p:txBody>
+          <a:bodyPr rtlCol="0" anchor="ctr"/>
+          <a:lstStyle/>
+          <a:p>
+            <a:pPr algn="ctr"/>
+            <a:endParaRPr lang="en-US"/>
+          </a:p>
+        </p:txBody>
+      </p:sp>
+      <p:sp>
+        <p:nvSpPr>
+          <p:cNvPr id="14" name="TextBox 13"/>
+          <p:cNvSpPr txBox="1"/>
+          <p:nvPr/>
+        </p:nvSpPr>
+        <p:spPr>
+          <a:xfrm>
+            <a:off x="2818356" y="5686816"/>
+            <a:ext cx="2843408" cy="369332"/>
+          </a:xfrm>
+          <a:prstGeom prst="rect">
+            <a:avLst/>
+          </a:prstGeom>
+          <a:noFill/>
+        </p:spPr>
+        <p:txBody>
+          <a:bodyPr wrap="square" rtlCol="0">
+            <a:spAutoFit/>
+          </a:bodyPr>
+          <a:lstStyle/>
+          <a:p>
+            <a:r>
+              <a:rPr lang="en-US" dirty="0"/>
+              <a:t>Employee lifetime value</a:t>
+            </a:r>
+          </a:p>
+        </p:txBody>
+      </p:sp>
+      <p:sp>
+        <p:nvSpPr>
+          <p:cNvPr id="15" name="TextBox 14"/>
+          <p:cNvSpPr txBox="1"/>
+          <p:nvPr/>
+        </p:nvSpPr>
+        <p:spPr>
+          <a:xfrm rot="16200000">
+            <a:off x="571037" y="3287532"/>
+            <a:ext cx="1778696" cy="366713"/>
+          </a:xfrm>
+          <a:prstGeom prst="rect">
+            <a:avLst/>
+          </a:prstGeom>
+          <a:noFill/>
+        </p:spPr>
+        <p:txBody>
+          <a:bodyPr wrap="square" rtlCol="0">
+            <a:spAutoFit/>
+          </a:bodyPr>
+          <a:lstStyle/>
+          <a:p>
+            <a:r>
+              <a:rPr lang="en-US"/>
+              <a:t>Attrition Risk</a:t>
+            </a:r>
+          </a:p>
+        </p:txBody>
+      </p:sp>
+      <p:sp>
+        <p:nvSpPr>
+          <p:cNvPr id="16" name="TextBox 15"/>
+          <p:cNvSpPr txBox="1"/>
+          <p:nvPr/>
+        </p:nvSpPr>
+        <p:spPr>
+          <a:xfrm>
+            <a:off x="4471792" y="3990905"/>
+            <a:ext cx="1189972" cy="369332"/>
+          </a:xfrm>
+          <a:prstGeom prst="rect">
+            <a:avLst/>
+          </a:prstGeom>
+          <a:noFill/>
+        </p:spPr>
+        <p:txBody>
+          <a:bodyPr wrap="square" rtlCol="0">
+            <a:spAutoFit/>
+          </a:bodyPr>
+          <a:lstStyle/>
+          <a:p>
+            <a:r>
+              <a:rPr lang="en-US" dirty="0"/>
+              <a:t>Maintain</a:t>
+            </a:r>
+          </a:p>
+        </p:txBody>
+      </p:sp>
+      <p:sp>
+        <p:nvSpPr>
+          <p:cNvPr id="17" name="TextBox 16"/>
+          <p:cNvSpPr txBox="1"/>
+          <p:nvPr/>
+        </p:nvSpPr>
+        <p:spPr>
+          <a:xfrm>
+            <a:off x="2567836" y="3990905"/>
+            <a:ext cx="1114816" cy="369332"/>
+          </a:xfrm>
+          <a:prstGeom prst="rect">
+            <a:avLst/>
+          </a:prstGeom>
+          <a:noFill/>
+        </p:spPr>
+        <p:txBody>
+          <a:bodyPr wrap="square" rtlCol="0">
+            <a:spAutoFit/>
+          </a:bodyPr>
+          <a:lstStyle/>
+          <a:p>
+            <a:r>
+              <a:rPr lang="en-US" dirty="0"/>
+              <a:t>Grow-up</a:t>
+            </a:r>
+          </a:p>
+        </p:txBody>
+      </p:sp>
+      <p:sp>
+        <p:nvSpPr>
+          <p:cNvPr id="18" name="TextBox 17"/>
+          <p:cNvSpPr txBox="1"/>
+          <p:nvPr/>
+        </p:nvSpPr>
+        <p:spPr>
+          <a:xfrm>
+            <a:off x="2567836" y="2204613"/>
+            <a:ext cx="1114816" cy="376960"/>
+          </a:xfrm>
+          <a:prstGeom prst="rect">
+            <a:avLst/>
+          </a:prstGeom>
+          <a:noFill/>
+        </p:spPr>
+        <p:txBody>
+          <a:bodyPr wrap="square" rtlCol="0">
+            <a:spAutoFit/>
+          </a:bodyPr>
+          <a:lstStyle/>
+          <a:p>
+            <a:pPr algn="ctr"/>
+            <a:r>
+              <a:rPr lang="en-US" dirty="0"/>
+              <a:t>Divest?</a:t>
+            </a:r>
+          </a:p>
+        </p:txBody>
+      </p:sp>
+      <p:sp>
+        <p:nvSpPr>
+          <p:cNvPr id="19" name="TextBox 18"/>
+          <p:cNvSpPr txBox="1"/>
+          <p:nvPr/>
+        </p:nvSpPr>
+        <p:spPr>
+          <a:xfrm>
+            <a:off x="4264070" y="2195155"/>
+            <a:ext cx="1603332" cy="646331"/>
+          </a:xfrm>
+          <a:prstGeom prst="rect">
+            <a:avLst/>
+          </a:prstGeom>
+          <a:noFill/>
+        </p:spPr>
+        <p:txBody>
+          <a:bodyPr wrap="square" rtlCol="0">
+            <a:spAutoFit/>
+          </a:bodyPr>
+          <a:lstStyle/>
+          <a:p>
+            <a:pPr algn="ctr"/>
+            <a:r>
+              <a:rPr lang="en-US" dirty="0">
+                <a:solidFill>
+                  <a:schemeClr val="bg1"/>
+                </a:solidFill>
+              </a:rPr>
+              <a:t>Aggressively retain</a:t>
+            </a:r>
+          </a:p>
+        </p:txBody>
+      </p:sp>
+      <p:sp>
+        <p:nvSpPr>
+          <p:cNvPr id="20" name="TextBox 19"/>
+          <p:cNvSpPr txBox="1"/>
+          <p:nvPr/>
+        </p:nvSpPr>
+        <p:spPr>
+          <a:xfrm>
+            <a:off x="4366889" y="2855192"/>
+            <a:ext cx="1397694" cy="461665"/>
+          </a:xfrm>
+          <a:prstGeom prst="rect">
+            <a:avLst/>
+          </a:prstGeom>
+          <a:noFill/>
+        </p:spPr>
+        <p:txBody>
+          <a:bodyPr wrap="square" rtlCol="0">
+            <a:spAutoFit/>
+          </a:bodyPr>
+          <a:lstStyle/>
+          <a:p>
+            <a:pPr algn="ctr"/>
+            <a:r>
+              <a:rPr lang="en-US" sz="1200" dirty="0">
+                <a:solidFill>
+                  <a:schemeClr val="bg1"/>
+                </a:solidFill>
+              </a:rPr>
+              <a:t>High value.</a:t>
+            </a:r>
+          </a:p>
+          <a:p>
+            <a:pPr algn="ctr"/>
+            <a:r>
+              <a:rPr lang="en-US" sz="1200" dirty="0">
+                <a:solidFill>
+                  <a:schemeClr val="bg1"/>
+                </a:solidFill>
+              </a:rPr>
+              <a:t>High Attrition Risk</a:t>
+            </a:r>
+          </a:p>
+        </p:txBody>
+      </p:sp>
+      <p:sp>
+        <p:nvSpPr>
+          <p:cNvPr id="21" name="TextBox 20"/>
+          <p:cNvSpPr txBox="1"/>
+          <p:nvPr/>
+        </p:nvSpPr>
+        <p:spPr>
+          <a:xfrm>
+            <a:off x="4264070" y="4412668"/>
+            <a:ext cx="1397694" cy="461665"/>
+          </a:xfrm>
+          <a:prstGeom prst="rect">
+            <a:avLst/>
+          </a:prstGeom>
+          <a:noFill/>
+        </p:spPr>
+        <p:txBody>
+          <a:bodyPr wrap="square" rtlCol="0">
+            <a:spAutoFit/>
+          </a:bodyPr>
+          <a:lstStyle/>
+          <a:p>
+            <a:pPr algn="ctr"/>
+            <a:r>
+              <a:rPr lang="en-US" sz="1200" dirty="0"/>
+              <a:t>High value.</a:t>
+            </a:r>
+          </a:p>
+          <a:p>
+            <a:pPr algn="ctr"/>
+            <a:r>
+              <a:rPr lang="en-US" sz="1200" dirty="0"/>
+              <a:t>Low Attrition Risk</a:t>
+            </a:r>
+          </a:p>
+        </p:txBody>
+      </p:sp>
+      <p:sp>
+        <p:nvSpPr>
+          <p:cNvPr id="22" name="TextBox 21"/>
+          <p:cNvSpPr txBox="1"/>
+          <p:nvPr/>
+        </p:nvSpPr>
+        <p:spPr>
+          <a:xfrm>
+            <a:off x="2407608" y="4450155"/>
+            <a:ext cx="1397694" cy="461665"/>
+          </a:xfrm>
+          <a:prstGeom prst="rect">
+            <a:avLst/>
+          </a:prstGeom>
+          <a:noFill/>
+        </p:spPr>
+        <p:txBody>
+          <a:bodyPr wrap="square" rtlCol="0">
+            <a:spAutoFit/>
+          </a:bodyPr>
+          <a:lstStyle/>
+          <a:p>
+            <a:pPr algn="ctr"/>
+            <a:r>
+              <a:rPr lang="en-US" sz="1200" dirty="0"/>
+              <a:t>Low value.</a:t>
+            </a:r>
+          </a:p>
+          <a:p>
+            <a:pPr algn="ctr"/>
+            <a:r>
+              <a:rPr lang="en-US" sz="1200" dirty="0"/>
+              <a:t>Low Attrition Risk</a:t>
+            </a:r>
+          </a:p>
+        </p:txBody>
+      </p:sp>
+      <p:sp>
+        <p:nvSpPr>
+          <p:cNvPr id="23" name="TextBox 22"/>
+          <p:cNvSpPr txBox="1"/>
+          <p:nvPr/>
+        </p:nvSpPr>
+        <p:spPr>
+          <a:xfrm>
+            <a:off x="2426397" y="2874798"/>
+            <a:ext cx="1397694" cy="461665"/>
+          </a:xfrm>
+          <a:prstGeom prst="rect">
+            <a:avLst/>
+          </a:prstGeom>
+          <a:noFill/>
+        </p:spPr>
+        <p:txBody>
+          <a:bodyPr wrap="square" rtlCol="0">
+            <a:spAutoFit/>
+          </a:bodyPr>
+          <a:lstStyle/>
+          <a:p>
+            <a:pPr algn="ctr"/>
+            <a:r>
+              <a:rPr lang="en-US" sz="1200" dirty="0"/>
+              <a:t>Low value.</a:t>
+            </a:r>
+          </a:p>
+          <a:p>
+            <a:pPr algn="ctr"/>
+            <a:r>
+              <a:rPr lang="en-US" sz="1200" dirty="0"/>
+              <a:t>High Attrition Risk</a:t>
+            </a:r>
+          </a:p>
+        </p:txBody>
+      </p:sp>
+    </p:spTree>
+    <p:extLst>
+      <p:ext uri="{BB962C8B-B14F-4D97-AF65-F5344CB8AC3E}">
+        <p14:creationId xmlns:p14="http://schemas.microsoft.com/office/powerpoint/2010/main" val="1204180998"/>
+      </p:ext>
+    </p:extLst>
+  </p:cSld>
+  <p:clrMapOvr>
+    <a:masterClrMapping/>
+  </p:clrMapOvr>
+  <mc:AlternateContent xmlns:mc="http://schemas.openxmlformats.org/markup-compatibility/2006" xmlns:p14="http://schemas.microsoft.com/office/powerpoint/2010/main">
+    <mc:Choice Requires="p14">
+      <p:transition p14:dur="0" advClick="0" advTm="15000"/>
+    </mc:Choice>
+    <mc:Fallback xmlns="">
+      <p:transition advClick="0" advTm="15000"/>
+    </mc:Fallback>
+  </mc:AlternateContent>
+</p:sld>
+</file>
+
+<file path=ppt/slides/slide40.xml><?xml version="1.0" encoding="utf-8"?>
+<p:sld xmlns:a="http://schemas.openxmlformats.org/drawingml/2006/main" xmlns:r="http://schemas.openxmlformats.org/officeDocument/2006/relationships" xmlns:p="http://schemas.openxmlformats.org/presentationml/2006/main">
+  <p:cSld>
+    <p:spTree>
+      <p:nvGrpSpPr>
+        <p:cNvPr id="1" name=""/>
+        <p:cNvGrpSpPr/>
+        <p:nvPr/>
+      </p:nvGrpSpPr>
+      <p:grpSpPr>
+        <a:xfrm>
+          <a:off x="0" y="0"/>
+          <a:ext cx="0" cy="0"/>
+          <a:chOff x="0" y="0"/>
+          <a:chExt cx="0" cy="0"/>
+        </a:xfrm>
+      </p:grpSpPr>
+      <p:sp>
+        <p:nvSpPr>
           <p:cNvPr id="2" name="Title 1">
             <a:extLst>
               <a:ext uri="{FF2B5EF4-FFF2-40B4-BE49-F238E27FC236}">
@@ -10060,13 +9566,16 @@
         </p:nvSpPr>
         <p:spPr/>
         <p:txBody>
-          <a:bodyPr/>
-          <a:lstStyle/>
-          <a:p>
-            <a:r>
-              <a:rPr lang="en-US" dirty="0"/>
-              <a:t>Summary</a:t>
-            </a:r>
+          <a:bodyPr>
+            <a:normAutofit fontScale="90000"/>
+          </a:bodyPr>
+          <a:lstStyle/>
+          <a:p>
+            <a:r>
+              <a:rPr lang="en-US" dirty="0" smtClean="0"/>
+              <a:t>Summary – Need to change Copy forward2 model fit equation</a:t>
+            </a:r>
+            <a:endParaRPr lang="en-US" dirty="0"/>
           </a:p>
         </p:txBody>
       </p:sp>
@@ -10140,7 +9649,7 @@
             <a:fld id="{38327683-8978-6B4B-9130-4A6A841F0549}" type="slidenum">
               <a:rPr lang="en-US" smtClean="0"/>
               <a:pPr/>
-              <a:t>42</a:t>
+              <a:t>40</a:t>
             </a:fld>
             <a:endParaRPr lang="en-US" dirty="0"/>
           </a:p>

</xml_diff>